<commit_message>
ppt and minor design changes
</commit_message>
<xml_diff>
--- a/W6 Project/KanenOnlineShopping.pptx
+++ b/W6 Project/KanenOnlineShopping.pptx
@@ -154,7 +154,7 @@
     </p:spTree>
     <p:extLst>
       <p:ext uri="{BB962C8B-B14F-4D97-AF65-F5344CB8AC3E}">
-        <p14:creationId xmlns:p14="http://schemas.microsoft.com/office/powerpoint/2010/main" xmlns="" val="2219768511"/>
+        <p14:creationId xmlns="" xmlns:p14="http://schemas.microsoft.com/office/powerpoint/2010/main" val="2219768511"/>
       </p:ext>
     </p:extLst>
   </p:cSld>
@@ -251,7 +251,7 @@
     </p:spTree>
     <p:extLst>
       <p:ext uri="{BB962C8B-B14F-4D97-AF65-F5344CB8AC3E}">
-        <p14:creationId xmlns:p14="http://schemas.microsoft.com/office/powerpoint/2010/main" xmlns="" val="2403535400"/>
+        <p14:creationId xmlns="" xmlns:p14="http://schemas.microsoft.com/office/powerpoint/2010/main" val="2403535400"/>
       </p:ext>
     </p:extLst>
   </p:cSld>
@@ -530,7 +530,7 @@
     </p:spTree>
     <p:extLst>
       <p:ext uri="{BB962C8B-B14F-4D97-AF65-F5344CB8AC3E}">
-        <p14:creationId xmlns:p14="http://schemas.microsoft.com/office/powerpoint/2010/main" xmlns="" val="501824940"/>
+        <p14:creationId xmlns="" xmlns:p14="http://schemas.microsoft.com/office/powerpoint/2010/main" val="501824940"/>
       </p:ext>
     </p:extLst>
   </p:cSld>
@@ -785,7 +785,7 @@
     </p:spTree>
     <p:extLst>
       <p:ext uri="{BB962C8B-B14F-4D97-AF65-F5344CB8AC3E}">
-        <p14:creationId xmlns:p14="http://schemas.microsoft.com/office/powerpoint/2010/main" xmlns="" val="722440911"/>
+        <p14:creationId xmlns="" xmlns:p14="http://schemas.microsoft.com/office/powerpoint/2010/main" val="722440911"/>
       </p:ext>
     </p:extLst>
   </p:cSld>
@@ -957,7 +957,7 @@
     </p:spTree>
     <p:extLst>
       <p:ext uri="{BB962C8B-B14F-4D97-AF65-F5344CB8AC3E}">
-        <p14:creationId xmlns:p14="http://schemas.microsoft.com/office/powerpoint/2010/main" xmlns="" val="2810871693"/>
+        <p14:creationId xmlns="" xmlns:p14="http://schemas.microsoft.com/office/powerpoint/2010/main" val="2810871693"/>
       </p:ext>
     </p:extLst>
   </p:cSld>
@@ -1139,7 +1139,7 @@
     </p:spTree>
     <p:extLst>
       <p:ext uri="{BB962C8B-B14F-4D97-AF65-F5344CB8AC3E}">
-        <p14:creationId xmlns:p14="http://schemas.microsoft.com/office/powerpoint/2010/main" xmlns="" val="4240091250"/>
+        <p14:creationId xmlns="" xmlns:p14="http://schemas.microsoft.com/office/powerpoint/2010/main" val="4240091250"/>
       </p:ext>
     </p:extLst>
   </p:cSld>
@@ -1183,7 +1183,7 @@
     </p:spTree>
     <p:extLst>
       <p:ext uri="{BB962C8B-B14F-4D97-AF65-F5344CB8AC3E}">
-        <p14:creationId xmlns:p14="http://schemas.microsoft.com/office/powerpoint/2010/main" xmlns="" val="2219768511"/>
+        <p14:creationId xmlns="" xmlns:p14="http://schemas.microsoft.com/office/powerpoint/2010/main" val="2219768511"/>
       </p:ext>
     </p:extLst>
   </p:cSld>
@@ -1358,7 +1358,7 @@
     </p:spTree>
     <p:extLst>
       <p:ext uri="{BB962C8B-B14F-4D97-AF65-F5344CB8AC3E}">
-        <p14:creationId xmlns:p14="http://schemas.microsoft.com/office/powerpoint/2010/main" xmlns="" val="1146943780"/>
+        <p14:creationId xmlns="" xmlns:p14="http://schemas.microsoft.com/office/powerpoint/2010/main" val="1146943780"/>
       </p:ext>
     </p:extLst>
   </p:cSld>
@@ -1536,7 +1536,7 @@
     </p:spTree>
     <p:extLst>
       <p:ext uri="{BB962C8B-B14F-4D97-AF65-F5344CB8AC3E}">
-        <p14:creationId xmlns:p14="http://schemas.microsoft.com/office/powerpoint/2010/main" xmlns="" val="922808211"/>
+        <p14:creationId xmlns="" xmlns:p14="http://schemas.microsoft.com/office/powerpoint/2010/main" val="922808211"/>
       </p:ext>
     </p:extLst>
   </p:cSld>
@@ -1714,7 +1714,7 @@
     </p:spTree>
     <p:extLst>
       <p:ext uri="{BB962C8B-B14F-4D97-AF65-F5344CB8AC3E}">
-        <p14:creationId xmlns:p14="http://schemas.microsoft.com/office/powerpoint/2010/main" xmlns="" val="1146943780"/>
+        <p14:creationId xmlns="" xmlns:p14="http://schemas.microsoft.com/office/powerpoint/2010/main" val="1146943780"/>
       </p:ext>
     </p:extLst>
   </p:cSld>
@@ -1892,7 +1892,7 @@
     </p:spTree>
     <p:extLst>
       <p:ext uri="{BB962C8B-B14F-4D97-AF65-F5344CB8AC3E}">
-        <p14:creationId xmlns:p14="http://schemas.microsoft.com/office/powerpoint/2010/main" xmlns="" val="922808211"/>
+        <p14:creationId xmlns="" xmlns:p14="http://schemas.microsoft.com/office/powerpoint/2010/main" val="922808211"/>
       </p:ext>
     </p:extLst>
   </p:cSld>
@@ -2136,7 +2136,7 @@
     </p:spTree>
     <p:extLst>
       <p:ext uri="{BB962C8B-B14F-4D97-AF65-F5344CB8AC3E}">
-        <p14:creationId xmlns:p14="http://schemas.microsoft.com/office/powerpoint/2010/main" xmlns="" val="1895959501"/>
+        <p14:creationId xmlns="" xmlns:p14="http://schemas.microsoft.com/office/powerpoint/2010/main" val="1895959501"/>
       </p:ext>
     </p:extLst>
   </p:cSld>
@@ -2308,7 +2308,7 @@
     </p:spTree>
     <p:extLst>
       <p:ext uri="{BB962C8B-B14F-4D97-AF65-F5344CB8AC3E}">
-        <p14:creationId xmlns:p14="http://schemas.microsoft.com/office/powerpoint/2010/main" xmlns="" val="815133034"/>
+        <p14:creationId xmlns="" xmlns:p14="http://schemas.microsoft.com/office/powerpoint/2010/main" val="815133034"/>
       </p:ext>
     </p:extLst>
   </p:cSld>
@@ -2556,7 +2556,7 @@
     </p:spTree>
     <p:extLst>
       <p:ext uri="{BB962C8B-B14F-4D97-AF65-F5344CB8AC3E}">
-        <p14:creationId xmlns:p14="http://schemas.microsoft.com/office/powerpoint/2010/main" xmlns="" val="1860431105"/>
+        <p14:creationId xmlns="" xmlns:p14="http://schemas.microsoft.com/office/powerpoint/2010/main" val="1860431105"/>
       </p:ext>
     </p:extLst>
   </p:cSld>
@@ -2846,7 +2846,7 @@
     </p:spTree>
     <p:extLst>
       <p:ext uri="{BB962C8B-B14F-4D97-AF65-F5344CB8AC3E}">
-        <p14:creationId xmlns:p14="http://schemas.microsoft.com/office/powerpoint/2010/main" xmlns="" val="3505802917"/>
+        <p14:creationId xmlns="" xmlns:p14="http://schemas.microsoft.com/office/powerpoint/2010/main" val="3505802917"/>
       </p:ext>
     </p:extLst>
   </p:cSld>
@@ -3270,7 +3270,7 @@
     </p:spTree>
     <p:extLst>
       <p:ext uri="{BB962C8B-B14F-4D97-AF65-F5344CB8AC3E}">
-        <p14:creationId xmlns:p14="http://schemas.microsoft.com/office/powerpoint/2010/main" xmlns="" val="3538794029"/>
+        <p14:creationId xmlns="" xmlns:p14="http://schemas.microsoft.com/office/powerpoint/2010/main" val="3538794029"/>
       </p:ext>
     </p:extLst>
   </p:cSld>
@@ -3390,7 +3390,7 @@
     </p:spTree>
     <p:extLst>
       <p:ext uri="{BB962C8B-B14F-4D97-AF65-F5344CB8AC3E}">
-        <p14:creationId xmlns:p14="http://schemas.microsoft.com/office/powerpoint/2010/main" xmlns="" val="1150510990"/>
+        <p14:creationId xmlns="" xmlns:p14="http://schemas.microsoft.com/office/powerpoint/2010/main" val="1150510990"/>
       </p:ext>
     </p:extLst>
   </p:cSld>
@@ -3428,7 +3428,7 @@
     </p:spTree>
     <p:extLst>
       <p:ext uri="{BB962C8B-B14F-4D97-AF65-F5344CB8AC3E}">
-        <p14:creationId xmlns:p14="http://schemas.microsoft.com/office/powerpoint/2010/main" xmlns="" val="4252391796"/>
+        <p14:creationId xmlns="" xmlns:p14="http://schemas.microsoft.com/office/powerpoint/2010/main" val="4252391796"/>
       </p:ext>
     </p:extLst>
   </p:cSld>
@@ -3932,7 +3932,7 @@
     </p:spTree>
     <p:extLst>
       <p:ext uri="{BB962C8B-B14F-4D97-AF65-F5344CB8AC3E}">
-        <p14:creationId xmlns:p14="http://schemas.microsoft.com/office/powerpoint/2010/main" xmlns="" val="2621239905"/>
+        <p14:creationId xmlns="" xmlns:p14="http://schemas.microsoft.com/office/powerpoint/2010/main" val="2621239905"/>
       </p:ext>
     </p:extLst>
   </p:cSld>
@@ -4231,7 +4231,7 @@
     </p:spTree>
     <p:extLst>
       <p:ext uri="{BB962C8B-B14F-4D97-AF65-F5344CB8AC3E}">
-        <p14:creationId xmlns:p14="http://schemas.microsoft.com/office/powerpoint/2010/main" xmlns="" val="4252391796"/>
+        <p14:creationId xmlns="" xmlns:p14="http://schemas.microsoft.com/office/powerpoint/2010/main" val="4252391796"/>
       </p:ext>
     </p:extLst>
   </p:cSld>
@@ -4838,7 +4838,7 @@
     </p:spTree>
     <p:extLst>
       <p:ext uri="{BB962C8B-B14F-4D97-AF65-F5344CB8AC3E}">
-        <p14:creationId xmlns:p14="http://schemas.microsoft.com/office/powerpoint/2010/main" xmlns="" val="303447833"/>
+        <p14:creationId xmlns="" xmlns:p14="http://schemas.microsoft.com/office/powerpoint/2010/main" val="303447833"/>
       </p:ext>
     </p:extLst>
   </p:cSld>
@@ -4903,7 +4903,7 @@
     </p:spTree>
     <p:extLst>
       <p:ext uri="{BB962C8B-B14F-4D97-AF65-F5344CB8AC3E}">
-        <p14:creationId xmlns:p14="http://schemas.microsoft.com/office/powerpoint/2010/main" xmlns="" val="979107610"/>
+        <p14:creationId xmlns="" xmlns:p14="http://schemas.microsoft.com/office/powerpoint/2010/main" val="979107610"/>
       </p:ext>
     </p:extLst>
   </p:cSld>
@@ -5184,7 +5184,7 @@
     </p:spTree>
     <p:extLst>
       <p:ext uri="{BB962C8B-B14F-4D97-AF65-F5344CB8AC3E}">
-        <p14:creationId xmlns:p14="http://schemas.microsoft.com/office/powerpoint/2010/main" xmlns="" val="979107610"/>
+        <p14:creationId xmlns="" xmlns:p14="http://schemas.microsoft.com/office/powerpoint/2010/main" val="979107610"/>
       </p:ext>
     </p:extLst>
   </p:cSld>
@@ -5246,7 +5246,7 @@
     </p:spTree>
     <p:extLst>
       <p:ext uri="{BB962C8B-B14F-4D97-AF65-F5344CB8AC3E}">
-        <p14:creationId xmlns:p14="http://schemas.microsoft.com/office/powerpoint/2010/main" xmlns="" val="979107610"/>
+        <p14:creationId xmlns="" xmlns:p14="http://schemas.microsoft.com/office/powerpoint/2010/main" val="979107610"/>
       </p:ext>
     </p:extLst>
   </p:cSld>
@@ -5771,8 +5771,149 @@
                 <a:ea typeface="+mn-ea"/>
                 <a:cs typeface="Arial" pitchFamily="34" charset="0"/>
               </a:rPr>
-              <a:t> Blacklist users</a:t>
-            </a:r>
+              <a:t> </a:t>
+            </a:r>
+            <a:r>
+              <a:rPr kumimoji="0" lang="en-US" altLang="ko-KR" sz="1400" b="0" i="0" u="none" strike="noStrike" kern="1200" cap="none" spc="0" normalizeH="0" noProof="0" dirty="0" smtClean="0">
+                <a:ln>
+                  <a:noFill/>
+                </a:ln>
+                <a:solidFill>
+                  <a:schemeClr val="tx1">
+                    <a:lumMod val="75000"/>
+                    <a:lumOff val="25000"/>
+                  </a:schemeClr>
+                </a:solidFill>
+                <a:effectLst/>
+                <a:uLnTx/>
+                <a:uFillTx/>
+                <a:latin typeface="Arial" pitchFamily="34" charset="0"/>
+                <a:ea typeface="+mn-ea"/>
+                <a:cs typeface="Arial" pitchFamily="34" charset="0"/>
+              </a:rPr>
+              <a:t>User maintenance</a:t>
+            </a:r>
+          </a:p>
+          <a:p>
+            <a:pPr marL="0" marR="0" lvl="0" indent="0" algn="l" defTabSz="914400" rtl="0" eaLnBrk="1" fontAlgn="auto" latinLnBrk="1" hangingPunct="1">
+              <a:lnSpc>
+                <a:spcPct val="100000"/>
+              </a:lnSpc>
+              <a:spcBef>
+                <a:spcPct val="20000"/>
+              </a:spcBef>
+              <a:spcAft>
+                <a:spcPts val="0"/>
+              </a:spcAft>
+              <a:buClrTx/>
+              <a:buSzTx/>
+              <a:buFont typeface="Arial" pitchFamily="34" charset="0"/>
+              <a:buChar char="•"/>
+              <a:tabLst/>
+              <a:defRPr/>
+            </a:pPr>
+            <a:r>
+              <a:rPr lang="en-US" altLang="ko-KR" sz="1400" noProof="0" dirty="0" smtClean="0">
+                <a:solidFill>
+                  <a:schemeClr val="tx1">
+                    <a:lumMod val="75000"/>
+                    <a:lumOff val="25000"/>
+                  </a:schemeClr>
+                </a:solidFill>
+                <a:latin typeface="Arial" pitchFamily="34" charset="0"/>
+                <a:cs typeface="Arial" pitchFamily="34" charset="0"/>
+              </a:rPr>
+              <a:t> </a:t>
+            </a:r>
+            <a:r>
+              <a:rPr lang="en-US" altLang="ko-KR" sz="1400" noProof="0" dirty="0" smtClean="0">
+                <a:solidFill>
+                  <a:schemeClr val="tx1">
+                    <a:lumMod val="75000"/>
+                    <a:lumOff val="25000"/>
+                  </a:schemeClr>
+                </a:solidFill>
+                <a:latin typeface="Arial" pitchFamily="34" charset="0"/>
+                <a:cs typeface="Arial" pitchFamily="34" charset="0"/>
+              </a:rPr>
+              <a:t>View product comments</a:t>
+            </a:r>
+          </a:p>
+          <a:p>
+            <a:pPr marL="0" marR="0" lvl="0" indent="0" algn="l" defTabSz="914400" rtl="0" eaLnBrk="1" fontAlgn="auto" latinLnBrk="1" hangingPunct="1">
+              <a:lnSpc>
+                <a:spcPct val="100000"/>
+              </a:lnSpc>
+              <a:spcBef>
+                <a:spcPct val="20000"/>
+              </a:spcBef>
+              <a:spcAft>
+                <a:spcPts val="0"/>
+              </a:spcAft>
+              <a:buClrTx/>
+              <a:buSzTx/>
+              <a:buFont typeface="Arial" pitchFamily="34" charset="0"/>
+              <a:buChar char="•"/>
+              <a:tabLst/>
+              <a:defRPr/>
+            </a:pPr>
+            <a:r>
+              <a:rPr kumimoji="0" lang="en-US" altLang="ko-KR" sz="1400" b="0" i="0" u="none" strike="noStrike" kern="1200" cap="none" spc="0" normalizeH="0" dirty="0" smtClean="0">
+                <a:ln>
+                  <a:noFill/>
+                </a:ln>
+                <a:solidFill>
+                  <a:schemeClr val="tx1">
+                    <a:lumMod val="75000"/>
+                    <a:lumOff val="25000"/>
+                  </a:schemeClr>
+                </a:solidFill>
+                <a:effectLst/>
+                <a:uLnTx/>
+                <a:uFillTx/>
+                <a:latin typeface="Arial" pitchFamily="34" charset="0"/>
+                <a:ea typeface="+mn-ea"/>
+                <a:cs typeface="Arial" pitchFamily="34" charset="0"/>
+              </a:rPr>
+              <a:t> </a:t>
+            </a:r>
+            <a:r>
+              <a:rPr kumimoji="0" lang="en-US" altLang="ko-KR" sz="1400" b="0" i="0" u="none" strike="noStrike" kern="1200" cap="none" spc="0" normalizeH="0" dirty="0" smtClean="0">
+                <a:ln>
+                  <a:noFill/>
+                </a:ln>
+                <a:solidFill>
+                  <a:schemeClr val="tx1">
+                    <a:lumMod val="75000"/>
+                    <a:lumOff val="25000"/>
+                  </a:schemeClr>
+                </a:solidFill>
+                <a:effectLst/>
+                <a:uLnTx/>
+                <a:uFillTx/>
+                <a:latin typeface="Arial" pitchFamily="34" charset="0"/>
+                <a:ea typeface="+mn-ea"/>
+                <a:cs typeface="Arial" pitchFamily="34" charset="0"/>
+              </a:rPr>
+              <a:t>Order maintenance</a:t>
+            </a:r>
+            <a:endParaRPr kumimoji="0" lang="en-US" altLang="ko-KR" sz="1400" b="0" i="0" u="none" strike="noStrike" kern="1200" cap="none" spc="0" normalizeH="0" noProof="0" dirty="0" smtClean="0">
+              <a:ln>
+                <a:noFill/>
+              </a:ln>
+              <a:solidFill>
+                <a:schemeClr val="tx1">
+                  <a:lumMod val="75000"/>
+                  <a:lumOff val="25000"/>
+                </a:schemeClr>
+              </a:solidFill>
+              <a:effectLst/>
+              <a:uLnTx/>
+              <a:uFillTx/>
+              <a:latin typeface="Arial" pitchFamily="34" charset="0"/>
+              <a:ea typeface="+mn-ea"/>
+              <a:cs typeface="Arial" pitchFamily="34" charset="0"/>
+            </a:endParaRPr>
           </a:p>
           <a:p>
             <a:pPr marL="0" marR="0" lvl="0" indent="0" algn="l" defTabSz="914400" rtl="0" eaLnBrk="1" fontAlgn="auto" latinLnBrk="1" hangingPunct="1">
@@ -5942,7 +6083,7 @@
     </p:spTree>
     <p:extLst>
       <p:ext uri="{BB962C8B-B14F-4D97-AF65-F5344CB8AC3E}">
-        <p14:creationId xmlns:p14="http://schemas.microsoft.com/office/powerpoint/2010/main" xmlns="" val="2090594489"/>
+        <p14:creationId xmlns="" xmlns:p14="http://schemas.microsoft.com/office/powerpoint/2010/main" val="2090594489"/>
       </p:ext>
     </p:extLst>
   </p:cSld>
@@ -6833,7 +6974,20 @@
                 <a:latin typeface="Arial" pitchFamily="34" charset="0"/>
                 <a:cs typeface="Arial" pitchFamily="34" charset="0"/>
               </a:rPr>
-              <a:t>load on login</a:t>
+              <a:t>load on </a:t>
+            </a:r>
+            <a:r>
+              <a:rPr lang="en-US" altLang="ko-KR" sz="1400" baseline="0" dirty="0" smtClean="0">
+                <a:solidFill>
+                  <a:schemeClr val="tx1">
+                    <a:lumMod val="75000"/>
+                    <a:lumOff val="25000"/>
+                  </a:schemeClr>
+                </a:solidFill>
+                <a:latin typeface="Arial" pitchFamily="34" charset="0"/>
+                <a:cs typeface="Arial" pitchFamily="34" charset="0"/>
+              </a:rPr>
+              <a:t>login</a:t>
             </a:r>
           </a:p>
           <a:p>
@@ -6855,6 +7009,61 @@
               <a:defRPr/>
             </a:pPr>
             <a:r>
+              <a:rPr lang="en-US" altLang="ko-KR" sz="1400" dirty="0" smtClean="0">
+                <a:solidFill>
+                  <a:schemeClr val="tx1">
+                    <a:lumMod val="75000"/>
+                    <a:lumOff val="25000"/>
+                  </a:schemeClr>
+                </a:solidFill>
+                <a:latin typeface="Arial" pitchFamily="34" charset="0"/>
+                <a:cs typeface="Arial" pitchFamily="34" charset="0"/>
+              </a:rPr>
+              <a:t> </a:t>
+            </a:r>
+            <a:r>
+              <a:rPr lang="en-US" altLang="ko-KR" sz="1400" dirty="0" smtClean="0">
+                <a:solidFill>
+                  <a:schemeClr val="tx1">
+                    <a:lumMod val="75000"/>
+                    <a:lumOff val="25000"/>
+                  </a:schemeClr>
+                </a:solidFill>
+                <a:latin typeface="Arial" pitchFamily="34" charset="0"/>
+                <a:cs typeface="Arial" pitchFamily="34" charset="0"/>
+              </a:rPr>
+              <a:t>remove cart</a:t>
+            </a:r>
+            <a:endParaRPr lang="en-US" altLang="ko-KR" sz="1400" baseline="0" dirty="0" smtClean="0">
+              <a:solidFill>
+                <a:schemeClr val="tx1">
+                  <a:lumMod val="75000"/>
+                  <a:lumOff val="25000"/>
+                </a:schemeClr>
+              </a:solidFill>
+              <a:latin typeface="Arial" pitchFamily="34" charset="0"/>
+              <a:cs typeface="Arial" pitchFamily="34" charset="0"/>
+            </a:endParaRPr>
+          </a:p>
+          <a:p>
+            <a:pPr marL="0" marR="0" lvl="0" indent="0" algn="l" defTabSz="914400" rtl="0" eaLnBrk="1" fontAlgn="auto" latinLnBrk="1" hangingPunct="1">
+              <a:lnSpc>
+                <a:spcPct val="100000"/>
+              </a:lnSpc>
+              <a:spcBef>
+                <a:spcPct val="20000"/>
+              </a:spcBef>
+              <a:spcAft>
+                <a:spcPts val="0"/>
+              </a:spcAft>
+              <a:buClrTx/>
+              <a:buSzTx/>
+              <a:buFont typeface="Arial" pitchFamily="34" charset="0"/>
+              <a:buChar char="•"/>
+              <a:tabLst/>
+              <a:defRPr/>
+            </a:pPr>
+            <a:r>
               <a:rPr kumimoji="0" lang="en-US" altLang="ko-KR" sz="1400" b="0" i="0" u="none" strike="noStrike" kern="1200" cap="none" spc="0" normalizeH="0" noProof="0" dirty="0" smtClean="0">
                 <a:ln>
                   <a:noFill/>
@@ -7242,16 +7451,36 @@
                 <a:latin typeface="Arial" pitchFamily="34" charset="0"/>
                 <a:cs typeface="Arial" pitchFamily="34" charset="0"/>
               </a:rPr>
-              <a:t> – form, controller and DAO</a:t>
-            </a:r>
-            <a:endParaRPr lang="en-US" altLang="ko-KR" sz="1400" baseline="0" dirty="0" smtClean="0">
+              <a:t> – form, controller and </a:t>
+            </a:r>
+            <a:r>
+              <a:rPr lang="en-US" altLang="ko-KR" sz="1400" dirty="0" smtClean="0">
+                <a:solidFill>
+                  <a:schemeClr val="tx1">
+                    <a:lumMod val="75000"/>
+                    <a:lumOff val="25000"/>
+                  </a:schemeClr>
+                </a:solidFill>
+                <a:latin typeface="Arial" pitchFamily="34" charset="0"/>
+                <a:cs typeface="Arial" pitchFamily="34" charset="0"/>
+              </a:rPr>
+              <a:t>DAO</a:t>
+            </a:r>
+            <a:endParaRPr kumimoji="0" lang="en-US" altLang="ko-KR" sz="1400" b="0" i="0" u="none" strike="noStrike" kern="1200" cap="none" spc="0" normalizeH="0" noProof="0" dirty="0" smtClean="0">
+              <a:ln>
+                <a:noFill/>
+              </a:ln>
               <a:solidFill>
                 <a:schemeClr val="tx1">
                   <a:lumMod val="75000"/>
                   <a:lumOff val="25000"/>
                 </a:schemeClr>
               </a:solidFill>
+              <a:effectLst/>
+              <a:uLnTx/>
+              <a:uFillTx/>
               <a:latin typeface="Arial" pitchFamily="34" charset="0"/>
+              <a:ea typeface="+mn-ea"/>
               <a:cs typeface="Arial" pitchFamily="34" charset="0"/>
             </a:endParaRPr>
           </a:p>
@@ -7274,24 +7503,105 @@
               <a:defRPr/>
             </a:pPr>
             <a:r>
-              <a:rPr kumimoji="0" lang="en-US" altLang="ko-KR" sz="1400" b="0" i="0" u="none" strike="noStrike" kern="1200" cap="none" spc="0" normalizeH="0" noProof="0" dirty="0" smtClean="0">
-                <a:ln>
-                  <a:noFill/>
-                </a:ln>
+              <a:rPr lang="en-US" altLang="ko-KR" sz="1400" noProof="0" dirty="0" smtClean="0">
                 <a:solidFill>
                   <a:schemeClr val="tx1">
                     <a:lumMod val="75000"/>
                     <a:lumOff val="25000"/>
                   </a:schemeClr>
                 </a:solidFill>
-                <a:effectLst/>
-                <a:uLnTx/>
-                <a:uFillTx/>
                 <a:latin typeface="Arial" pitchFamily="34" charset="0"/>
-                <a:ea typeface="+mn-ea"/>
-                <a:cs typeface="Arial" pitchFamily="34" charset="0"/>
-              </a:rPr>
-              <a:t> Membership Type controller</a:t>
+                <a:cs typeface="Arial" pitchFamily="34" charset="0"/>
+              </a:rPr>
+              <a:t> </a:t>
+            </a:r>
+            <a:r>
+              <a:rPr lang="en-US" altLang="ko-KR" sz="1400" noProof="0" dirty="0" smtClean="0">
+                <a:solidFill>
+                  <a:schemeClr val="tx1">
+                    <a:lumMod val="75000"/>
+                    <a:lumOff val="25000"/>
+                  </a:schemeClr>
+                </a:solidFill>
+                <a:latin typeface="Arial" pitchFamily="34" charset="0"/>
+                <a:cs typeface="Arial" pitchFamily="34" charset="0"/>
+              </a:rPr>
+              <a:t>M</a:t>
+            </a:r>
+            <a:r>
+              <a:rPr lang="en-US" altLang="ko-KR" sz="1400" dirty="0" err="1" smtClean="0">
+                <a:solidFill>
+                  <a:schemeClr val="tx1">
+                    <a:lumMod val="75000"/>
+                    <a:lumOff val="25000"/>
+                  </a:schemeClr>
+                </a:solidFill>
+                <a:latin typeface="Arial" pitchFamily="34" charset="0"/>
+                <a:cs typeface="Arial" pitchFamily="34" charset="0"/>
+              </a:rPr>
+              <a:t>ost</a:t>
+            </a:r>
+            <a:r>
+              <a:rPr lang="en-US" altLang="ko-KR" sz="1400" dirty="0" smtClean="0">
+                <a:solidFill>
+                  <a:schemeClr val="tx1">
+                    <a:lumMod val="75000"/>
+                    <a:lumOff val="25000"/>
+                  </a:schemeClr>
+                </a:solidFill>
+                <a:latin typeface="Arial" pitchFamily="34" charset="0"/>
+                <a:cs typeface="Arial" pitchFamily="34" charset="0"/>
+              </a:rPr>
+              <a:t> of the</a:t>
+            </a:r>
+            <a:r>
+              <a:rPr lang="en-US" altLang="ko-KR" sz="1400" noProof="0" dirty="0" smtClean="0">
+                <a:solidFill>
+                  <a:schemeClr val="tx1">
+                    <a:lumMod val="75000"/>
+                    <a:lumOff val="25000"/>
+                  </a:schemeClr>
+                </a:solidFill>
+                <a:latin typeface="Arial" pitchFamily="34" charset="0"/>
+                <a:cs typeface="Arial" pitchFamily="34" charset="0"/>
+              </a:rPr>
+              <a:t> entities </a:t>
+            </a:r>
+          </a:p>
+          <a:p>
+            <a:pPr>
+              <a:spcBef>
+                <a:spcPct val="20000"/>
+              </a:spcBef>
+              <a:buFont typeface="Arial" pitchFamily="34" charset="0"/>
+              <a:buChar char="•"/>
+              <a:defRPr/>
+            </a:pPr>
+            <a:r>
+              <a:rPr lang="en-US" altLang="ko-KR" sz="1400" dirty="0" smtClean="0">
+                <a:solidFill>
+                  <a:schemeClr val="tx1">
+                    <a:lumMod val="75000"/>
+                    <a:lumOff val="25000"/>
+                  </a:schemeClr>
+                </a:solidFill>
+                <a:latin typeface="Arial" pitchFamily="34" charset="0"/>
+                <a:cs typeface="Arial" pitchFamily="34" charset="0"/>
+              </a:rPr>
+              <a:t> Login </a:t>
+            </a:r>
+            <a:r>
+              <a:rPr lang="en-US" altLang="ko-KR" sz="1400" dirty="0" smtClean="0">
+                <a:solidFill>
+                  <a:schemeClr val="tx1">
+                    <a:lumMod val="75000"/>
+                    <a:lumOff val="25000"/>
+                  </a:schemeClr>
+                </a:solidFill>
+                <a:latin typeface="Arial" pitchFamily="34" charset="0"/>
+                <a:cs typeface="Arial" pitchFamily="34" charset="0"/>
+              </a:rPr>
+              <a:t>and register forms</a:t>
             </a:r>
           </a:p>
           <a:p>
@@ -7323,7 +7633,7 @@
                 <a:latin typeface="Arial" pitchFamily="34" charset="0"/>
                 <a:cs typeface="Arial" pitchFamily="34" charset="0"/>
               </a:rPr>
-              <a:t> All Entities                       </a:t>
+              <a:t>                      </a:t>
             </a:r>
             <a:endParaRPr kumimoji="0" lang="en-US" altLang="ko-KR" sz="1400" b="0" i="0" u="none" strike="noStrike" kern="1200" cap="none" spc="0" normalizeH="0" baseline="0" noProof="0" dirty="0" smtClean="0">
               <a:ln>
@@ -8143,7 +8453,7 @@
                 <a:ea typeface="+mn-ea"/>
                 <a:cs typeface="Arial" pitchFamily="34" charset="0"/>
               </a:rPr>
-              <a:t> Login and register forms</a:t>
+              <a:t> </a:t>
             </a:r>
             <a:endParaRPr kumimoji="0" lang="en-US" altLang="ko-KR" sz="1400" b="0" i="0" u="none" strike="noStrike" kern="1200" cap="none" spc="0" normalizeH="0" baseline="0" noProof="0" dirty="0" smtClean="0">
               <a:ln>
@@ -8168,7 +8478,7 @@
     </p:spTree>
     <p:extLst>
       <p:ext uri="{BB962C8B-B14F-4D97-AF65-F5344CB8AC3E}">
-        <p14:creationId xmlns:p14="http://schemas.microsoft.com/office/powerpoint/2010/main" xmlns="" val="2090594489"/>
+        <p14:creationId xmlns="" xmlns:p14="http://schemas.microsoft.com/office/powerpoint/2010/main" val="2090594489"/>
       </p:ext>
     </p:extLst>
   </p:cSld>
@@ -8430,7 +8740,7 @@
     </p:spTree>
     <p:extLst>
       <p:ext uri="{BB962C8B-B14F-4D97-AF65-F5344CB8AC3E}">
-        <p14:creationId xmlns:p14="http://schemas.microsoft.com/office/powerpoint/2010/main" xmlns="" val="2090594489"/>
+        <p14:creationId xmlns="" xmlns:p14="http://schemas.microsoft.com/office/powerpoint/2010/main" val="2090594489"/>
       </p:ext>
     </p:extLst>
   </p:cSld>
@@ -8499,7 +8809,7 @@
     </p:spTree>
     <p:extLst>
       <p:ext uri="{BB962C8B-B14F-4D97-AF65-F5344CB8AC3E}">
-        <p14:creationId xmlns:p14="http://schemas.microsoft.com/office/powerpoint/2010/main" xmlns="" val="979107610"/>
+        <p14:creationId xmlns="" xmlns:p14="http://schemas.microsoft.com/office/powerpoint/2010/main" val="979107610"/>
       </p:ext>
     </p:extLst>
   </p:cSld>
@@ -8595,7 +8905,7 @@
     </p:spTree>
     <p:extLst>
       <p:ext uri="{BB962C8B-B14F-4D97-AF65-F5344CB8AC3E}">
-        <p14:creationId xmlns:p14="http://schemas.microsoft.com/office/powerpoint/2010/main" xmlns="" val="2090594489"/>
+        <p14:creationId xmlns="" xmlns:p14="http://schemas.microsoft.com/office/powerpoint/2010/main" val="2090594489"/>
       </p:ext>
     </p:extLst>
   </p:cSld>
@@ -8691,7 +9001,7 @@
     </p:spTree>
     <p:extLst>
       <p:ext uri="{BB962C8B-B14F-4D97-AF65-F5344CB8AC3E}">
-        <p14:creationId xmlns:p14="http://schemas.microsoft.com/office/powerpoint/2010/main" xmlns="" val="2090594489"/>
+        <p14:creationId xmlns="" xmlns:p14="http://schemas.microsoft.com/office/powerpoint/2010/main" val="2090594489"/>
       </p:ext>
     </p:extLst>
   </p:cSld>
@@ -8786,7 +9096,7 @@
     </p:spTree>
     <p:extLst>
       <p:ext uri="{BB962C8B-B14F-4D97-AF65-F5344CB8AC3E}">
-        <p14:creationId xmlns:p14="http://schemas.microsoft.com/office/powerpoint/2010/main" xmlns="" val="979107610"/>
+        <p14:creationId xmlns="" xmlns:p14="http://schemas.microsoft.com/office/powerpoint/2010/main" val="979107610"/>
       </p:ext>
     </p:extLst>
   </p:cSld>
@@ -8880,7 +9190,7 @@
     </p:spTree>
     <p:extLst>
       <p:ext uri="{BB962C8B-B14F-4D97-AF65-F5344CB8AC3E}">
-        <p14:creationId xmlns:p14="http://schemas.microsoft.com/office/powerpoint/2010/main" xmlns="" val="979107610"/>
+        <p14:creationId xmlns="" xmlns:p14="http://schemas.microsoft.com/office/powerpoint/2010/main" val="979107610"/>
       </p:ext>
     </p:extLst>
   </p:cSld>

</xml_diff>